<commit_message>
Almost done with WHY section
</commit_message>
<xml_diff>
--- a/SL_website_components.pptx
+++ b/SL_website_components.pptx
@@ -7,6 +7,7 @@
   <p:sldIdLst>
     <p:sldId id="257" r:id="rId2"/>
     <p:sldId id="258" r:id="rId3"/>
+    <p:sldId id="259" r:id="rId4"/>
   </p:sldIdLst>
   <p:sldSz cx="9144000" cy="6858000" type="screen4x3"/>
   <p:notesSz cx="6858000" cy="9144000"/>
@@ -1558,6 +1559,13 @@
         </dgm:presLayoutVars>
       </dgm:prSet>
       <dgm:spPr/>
+      <dgm:t>
+        <a:bodyPr/>
+        <a:lstStyle/>
+        <a:p>
+          <a:endParaRPr lang="en-US"/>
+        </a:p>
+      </dgm:t>
     </dgm:pt>
     <dgm:pt modelId="{06BC75EC-62A1-9649-ADDE-8C5F6EC71E50}" type="pres">
       <dgm:prSet presAssocID="{4A74C196-E0CB-1249-B4E9-31D880902150}" presName="desTx" presStyleLbl="revTx" presStyleIdx="0" presStyleCnt="5">
@@ -1711,6 +1719,13 @@
         </dgm:presLayoutVars>
       </dgm:prSet>
       <dgm:spPr/>
+      <dgm:t>
+        <a:bodyPr/>
+        <a:lstStyle/>
+        <a:p>
+          <a:endParaRPr lang="en-US"/>
+        </a:p>
+      </dgm:t>
     </dgm:pt>
     <dgm:pt modelId="{46E28B06-E90D-394A-BC19-3F215570B9DD}" type="pres">
       <dgm:prSet presAssocID="{B497304B-0EC9-C641-878A-635376A1DC88}" presName="desTx" presStyleLbl="revTx" presStyleIdx="3" presStyleCnt="5">
@@ -1769,43 +1784,43 @@
     </dgm:pt>
   </dgm:ptLst>
   <dgm:cxnLst>
+    <dgm:cxn modelId="{DE342405-6108-1C4B-91B2-230A214F761E}" srcId="{F455E73B-139F-5B4C-B339-D53508984FF3}" destId="{F8AC6589-26B5-DA48-8E39-73845864B478}" srcOrd="0" destOrd="0" parTransId="{F5ED7CAF-3C86-6243-8636-8377907F25CF}" sibTransId="{9C503DC8-7079-DA42-824E-C7F895276D86}"/>
+    <dgm:cxn modelId="{27437533-6A4C-344C-A83F-EAC62C314FE1}" srcId="{B497304B-0EC9-C641-878A-635376A1DC88}" destId="{1DDCE655-072A-CA46-8C79-B81FBF221E88}" srcOrd="2" destOrd="0" parTransId="{9E541773-9C5F-5B4C-B64B-6558FE1FFD4C}" sibTransId="{EAFFAC9A-B74C-CC40-B663-FF1172784467}"/>
+    <dgm:cxn modelId="{28C87505-83FC-C642-9BA6-B28C71AFAFE7}" srcId="{84EC724F-CD95-8A47-AD7B-E40ECE29B29C}" destId="{5CCF9EF2-717F-1E48-AEF3-99045E9A72A6}" srcOrd="1" destOrd="0" parTransId="{C44D7D03-37CC-8944-AB22-C19942EA80E7}" sibTransId="{7728E7AD-756F-2446-BFE3-0B60C80651D9}"/>
     <dgm:cxn modelId="{F03AA9E4-0010-9942-9B2A-4B50E05BBE98}" srcId="{84EC724F-CD95-8A47-AD7B-E40ECE29B29C}" destId="{E72EECAB-7D2D-CB4B-8DB6-523626A56813}" srcOrd="0" destOrd="0" parTransId="{2E6CC1A7-A852-B747-86BB-1730EA0049E0}" sibTransId="{91A1F862-85B6-FB48-A1BF-875F58AFE334}"/>
+    <dgm:cxn modelId="{28C34488-F687-7F48-8FCD-8FB5629A17DE}" type="presOf" srcId="{3FA1105B-56D0-E742-B559-3423FE154781}" destId="{EC592A6F-44B1-8244-B7BE-E21154215D48}" srcOrd="0" destOrd="0" presId="urn:microsoft.com/office/officeart/2005/8/layout/chevron1"/>
+    <dgm:cxn modelId="{BC73F862-567A-4542-986C-7097C420A4F6}" type="presOf" srcId="{84EC724F-CD95-8A47-AD7B-E40ECE29B29C}" destId="{6BF6BCA7-8170-9B46-B85B-2EE60E0EBA22}" srcOrd="0" destOrd="0" presId="urn:microsoft.com/office/officeart/2005/8/layout/chevron1"/>
+    <dgm:cxn modelId="{3104ACF8-C7B2-E646-9307-509E63564DCE}" type="presOf" srcId="{B497304B-0EC9-C641-878A-635376A1DC88}" destId="{5ABC5531-B6FA-624C-8342-D73DBAC40F1F}" srcOrd="0" destOrd="0" presId="urn:microsoft.com/office/officeart/2005/8/layout/chevron1"/>
+    <dgm:cxn modelId="{59F04D35-4D43-0F49-A0B9-3BD4A902ACCB}" srcId="{3FA1105B-56D0-E742-B559-3423FE154781}" destId="{E78FED39-41C5-1B4A-9C79-C24870FED316}" srcOrd="1" destOrd="0" parTransId="{71A86EC9-0278-0641-832F-052ABDFBB45D}" sibTransId="{0D28240A-695C-1146-8FD1-30FE4A973B53}"/>
+    <dgm:cxn modelId="{91B4C5E6-E78A-1A45-B73A-BDC9382BFD5E}" type="presOf" srcId="{3696EE42-0699-5843-B317-54260231D197}" destId="{7C16100D-7D03-7B47-80B0-D8730883E916}" srcOrd="0" destOrd="0" presId="urn:microsoft.com/office/officeart/2005/8/layout/chevron1"/>
+    <dgm:cxn modelId="{3F5162CD-1DB9-9547-948B-87C63250F9A9}" type="presOf" srcId="{E78FED39-41C5-1B4A-9C79-C24870FED316}" destId="{2F587FE5-A5FC-D54E-A534-D04AAED85470}" srcOrd="0" destOrd="1" presId="urn:microsoft.com/office/officeart/2005/8/layout/chevron1"/>
+    <dgm:cxn modelId="{EB4010C5-6164-DC4A-BDE8-13135CBD5981}" type="presOf" srcId="{F455E73B-139F-5B4C-B339-D53508984FF3}" destId="{4E8F90C4-0AFD-BA4A-8721-D710906AC62E}" srcOrd="0" destOrd="0" presId="urn:microsoft.com/office/officeart/2005/8/layout/chevron1"/>
+    <dgm:cxn modelId="{4BB5B9E3-A0AD-0D46-9B53-6F2EF728A0BE}" srcId="{F455E73B-139F-5B4C-B339-D53508984FF3}" destId="{AAF01738-8176-D24E-9E49-953309BD4F92}" srcOrd="1" destOrd="0" parTransId="{2B561B21-0C85-C644-9513-738BF49AF334}" sibTransId="{2101BD5F-A817-9447-AA4F-F4CD3EE95FF0}"/>
+    <dgm:cxn modelId="{8B8B1ABD-6B7B-744C-9882-08C32F753AD1}" srcId="{7A57F91B-C114-8B4E-86B0-505DD9ED1F5A}" destId="{3696EE42-0699-5843-B317-54260231D197}" srcOrd="3" destOrd="0" parTransId="{0FFA1B8D-030F-9C47-BE23-2735147E75B5}" sibTransId="{7E24CA96-C115-514B-881D-5FECEDE39366}"/>
+    <dgm:cxn modelId="{E98BE5B1-30A6-1145-8D2F-5BFF1A9A1A00}" type="presOf" srcId="{F8AC6589-26B5-DA48-8E39-73845864B478}" destId="{7DFC62E4-E651-4F40-868C-EB54460A2F8C}" srcOrd="0" destOrd="0" presId="urn:microsoft.com/office/officeart/2005/8/layout/chevron1"/>
+    <dgm:cxn modelId="{281335DD-1C0C-6348-9D6D-EAC0AE110E8A}" type="presOf" srcId="{F074EDA9-7961-9341-94F4-2C8A448D4304}" destId="{46E28B06-E90D-394A-BC19-3F215570B9DD}" srcOrd="0" destOrd="0" presId="urn:microsoft.com/office/officeart/2005/8/layout/chevron1"/>
+    <dgm:cxn modelId="{F78D21E7-9EE7-F94E-9D7C-9DFE4F159838}" srcId="{7A57F91B-C114-8B4E-86B0-505DD9ED1F5A}" destId="{F455E73B-139F-5B4C-B339-D53508984FF3}" srcOrd="1" destOrd="0" parTransId="{F4541FD7-6E3C-3443-B621-FD7409CA5CAA}" sibTransId="{00230CA9-4B0B-B242-8D20-545200546735}"/>
+    <dgm:cxn modelId="{5CC9A1C7-2DE8-254A-8FCB-EB6EEC98F310}" srcId="{B497304B-0EC9-C641-878A-635376A1DC88}" destId="{AD2FACD8-51B8-194A-9DFA-BB7B3CA220D3}" srcOrd="1" destOrd="0" parTransId="{E7A017B2-CE99-0745-80EA-956548E1D6BF}" sibTransId="{8C2615CD-4925-A444-9F76-4C0AD254542F}"/>
+    <dgm:cxn modelId="{BD88610B-83C2-554A-B16B-0CC8CBCD3641}" srcId="{F455E73B-139F-5B4C-B339-D53508984FF3}" destId="{671EDA6E-6736-B447-9A01-111FEA05AE6F}" srcOrd="2" destOrd="0" parTransId="{56305F1A-C5ED-784E-87B0-54030273357F}" sibTransId="{E3612F99-4F16-C341-9440-0362D7B8DB67}"/>
+    <dgm:cxn modelId="{EE8516CC-D3EF-7A41-A9E3-703B74F1EE01}" srcId="{7A57F91B-C114-8B4E-86B0-505DD9ED1F5A}" destId="{B497304B-0EC9-C641-878A-635376A1DC88}" srcOrd="4" destOrd="0" parTransId="{E2CD0753-C669-9243-AB50-EB59323609C4}" sibTransId="{6D25F3CB-D3D1-AE49-9AD6-A8D2551A1BF9}"/>
+    <dgm:cxn modelId="{53C3307B-6F59-0C48-8AA6-80EE40A5DD77}" srcId="{B497304B-0EC9-C641-878A-635376A1DC88}" destId="{F074EDA9-7961-9341-94F4-2C8A448D4304}" srcOrd="0" destOrd="0" parTransId="{E3107CCF-9FBA-A849-9EEC-1FF1E43C56AD}" sibTransId="{11C6DF21-FC58-6147-87DF-2B1CC4183C4A}"/>
+    <dgm:cxn modelId="{24C71B9F-914C-3C4D-91F2-11D5276C9F4D}" type="presOf" srcId="{1DDCE655-072A-CA46-8C79-B81FBF221E88}" destId="{46E28B06-E90D-394A-BC19-3F215570B9DD}" srcOrd="0" destOrd="2" presId="urn:microsoft.com/office/officeart/2005/8/layout/chevron1"/>
+    <dgm:cxn modelId="{0DF81702-8693-DD47-9DFF-C7FB3F0A0D40}" type="presOf" srcId="{AAF01738-8176-D24E-9E49-953309BD4F92}" destId="{7DFC62E4-E651-4F40-868C-EB54460A2F8C}" srcOrd="0" destOrd="1" presId="urn:microsoft.com/office/officeart/2005/8/layout/chevron1"/>
+    <dgm:cxn modelId="{2B2CE414-CAEE-4140-BFF5-5D352478002A}" type="presOf" srcId="{68EF91FD-6D20-EC4E-94B8-6B157AAC0116}" destId="{8887EB1A-C2E2-3D48-B5DB-9F1B6E37194E}" srcOrd="0" destOrd="1" presId="urn:microsoft.com/office/officeart/2005/8/layout/chevron1"/>
+    <dgm:cxn modelId="{016F4BC6-4E7D-024B-B2E3-D1C8953222EB}" srcId="{3696EE42-0699-5843-B317-54260231D197}" destId="{68EF91FD-6D20-EC4E-94B8-6B157AAC0116}" srcOrd="1" destOrd="0" parTransId="{666B0721-335C-974B-873B-DF4D42244A8C}" sibTransId="{1D4D69E8-A37A-D049-B8E5-97D15112A038}"/>
+    <dgm:cxn modelId="{0E16EEB7-7C9A-404F-93EE-569F5E53271A}" srcId="{3696EE42-0699-5843-B317-54260231D197}" destId="{149B45F3-F4BD-BD49-9230-47834B8837E6}" srcOrd="0" destOrd="0" parTransId="{CCFA6060-31EF-0D43-96E6-385A35E5FB0B}" sibTransId="{E8D73227-72DA-A447-A8B7-EF0B54126978}"/>
+    <dgm:cxn modelId="{DD611928-440D-9C4B-8AAE-8F0B17483AB8}" srcId="{7A57F91B-C114-8B4E-86B0-505DD9ED1F5A}" destId="{4A74C196-E0CB-1249-B4E9-31D880902150}" srcOrd="0" destOrd="0" parTransId="{E1750942-93A4-7D4F-B907-5E9CAE950694}" sibTransId="{4110B16D-A48B-6F4E-BA79-244FDB8EBC24}"/>
+    <dgm:cxn modelId="{119D518A-F2B7-D24E-B8F9-FAC83CAA2AF8}" type="presOf" srcId="{149B45F3-F4BD-BD49-9230-47834B8837E6}" destId="{8887EB1A-C2E2-3D48-B5DB-9F1B6E37194E}" srcOrd="0" destOrd="0" presId="urn:microsoft.com/office/officeart/2005/8/layout/chevron1"/>
+    <dgm:cxn modelId="{3B1D797C-95C3-F44C-98AA-F1BA5422A5DA}" type="presOf" srcId="{7A57F91B-C114-8B4E-86B0-505DD9ED1F5A}" destId="{D2552DFF-6A88-8C4B-A337-5464BEB40A8D}" srcOrd="0" destOrd="0" presId="urn:microsoft.com/office/officeart/2005/8/layout/chevron1"/>
+    <dgm:cxn modelId="{BCB6C379-EA13-EB48-AC42-816FB8E9962E}" type="presOf" srcId="{5CCF9EF2-717F-1E48-AEF3-99045E9A72A6}" destId="{3F0F7C6D-0AC5-AB46-BF90-D57471BE8B55}" srcOrd="0" destOrd="1" presId="urn:microsoft.com/office/officeart/2005/8/layout/chevron1"/>
+    <dgm:cxn modelId="{6EB933D0-D521-6545-B383-51A82D1BF565}" type="presOf" srcId="{AD2FACD8-51B8-194A-9DFA-BB7B3CA220D3}" destId="{46E28B06-E90D-394A-BC19-3F215570B9DD}" srcOrd="0" destOrd="1" presId="urn:microsoft.com/office/officeart/2005/8/layout/chevron1"/>
     <dgm:cxn modelId="{F3D2BC01-9442-5449-B74A-83C88CCDA118}" type="presOf" srcId="{E72EECAB-7D2D-CB4B-8DB6-523626A56813}" destId="{3F0F7C6D-0AC5-AB46-BF90-D57471BE8B55}" srcOrd="0" destOrd="0" presId="urn:microsoft.com/office/officeart/2005/8/layout/chevron1"/>
-    <dgm:cxn modelId="{0DF81702-8693-DD47-9DFF-C7FB3F0A0D40}" type="presOf" srcId="{AAF01738-8176-D24E-9E49-953309BD4F92}" destId="{7DFC62E4-E651-4F40-868C-EB54460A2F8C}" srcOrd="0" destOrd="1" presId="urn:microsoft.com/office/officeart/2005/8/layout/chevron1"/>
+    <dgm:cxn modelId="{743EBC90-0CD7-2D4A-9427-84D8F0FCD55E}" type="presOf" srcId="{671EDA6E-6736-B447-9A01-111FEA05AE6F}" destId="{7DFC62E4-E651-4F40-868C-EB54460A2F8C}" srcOrd="0" destOrd="2" presId="urn:microsoft.com/office/officeart/2005/8/layout/chevron1"/>
+    <dgm:cxn modelId="{B4776EC2-37DF-FC46-B6CC-2030B7D6F4FA}" type="presOf" srcId="{7AF78604-2FF9-7A42-99C8-DCF0966BF795}" destId="{2F587FE5-A5FC-D54E-A534-D04AAED85470}" srcOrd="0" destOrd="0" presId="urn:microsoft.com/office/officeart/2005/8/layout/chevron1"/>
+    <dgm:cxn modelId="{0FDAFD2B-A48A-F844-8F2B-D902F986BD6B}" srcId="{7A57F91B-C114-8B4E-86B0-505DD9ED1F5A}" destId="{3FA1105B-56D0-E742-B559-3423FE154781}" srcOrd="5" destOrd="0" parTransId="{4343CE6F-96DF-D34C-B653-DCFAF56D9B91}" sibTransId="{5EF50988-4361-FB43-AD3B-8802A7763BB9}"/>
+    <dgm:cxn modelId="{3054953F-6410-7642-8638-3EF7007D4515}" srcId="{3FA1105B-56D0-E742-B559-3423FE154781}" destId="{7AF78604-2FF9-7A42-99C8-DCF0966BF795}" srcOrd="0" destOrd="0" parTransId="{270D2051-8376-2C42-BC29-A2EBB395EC43}" sibTransId="{D5AD0D8B-FC5D-104F-9E86-D81E5CEBDEA3}"/>
+    <dgm:cxn modelId="{707666A5-A598-A74B-976B-F01E6086B85B}" srcId="{7A57F91B-C114-8B4E-86B0-505DD9ED1F5A}" destId="{84EC724F-CD95-8A47-AD7B-E40ECE29B29C}" srcOrd="2" destOrd="0" parTransId="{73245F63-1FF5-5D4D-B103-E5FB4C6B96E2}" sibTransId="{CF37BA28-51CB-4B4C-ADB2-B56158860883}"/>
     <dgm:cxn modelId="{1D824A16-B5CE-F442-BF42-CC0B6C032613}" type="presOf" srcId="{4A74C196-E0CB-1249-B4E9-31D880902150}" destId="{0DE361F5-0520-2540-9FC8-4E0CB397F72A}" srcOrd="0" destOrd="0" presId="urn:microsoft.com/office/officeart/2005/8/layout/chevron1"/>
-    <dgm:cxn modelId="{707666A5-A598-A74B-976B-F01E6086B85B}" srcId="{7A57F91B-C114-8B4E-86B0-505DD9ED1F5A}" destId="{84EC724F-CD95-8A47-AD7B-E40ECE29B29C}" srcOrd="2" destOrd="0" parTransId="{73245F63-1FF5-5D4D-B103-E5FB4C6B96E2}" sibTransId="{CF37BA28-51CB-4B4C-ADB2-B56158860883}"/>
-    <dgm:cxn modelId="{0E16EEB7-7C9A-404F-93EE-569F5E53271A}" srcId="{3696EE42-0699-5843-B317-54260231D197}" destId="{149B45F3-F4BD-BD49-9230-47834B8837E6}" srcOrd="0" destOrd="0" parTransId="{CCFA6060-31EF-0D43-96E6-385A35E5FB0B}" sibTransId="{E8D73227-72DA-A447-A8B7-EF0B54126978}"/>
-    <dgm:cxn modelId="{4BB5B9E3-A0AD-0D46-9B53-6F2EF728A0BE}" srcId="{F455E73B-139F-5B4C-B339-D53508984FF3}" destId="{AAF01738-8176-D24E-9E49-953309BD4F92}" srcOrd="1" destOrd="0" parTransId="{2B561B21-0C85-C644-9513-738BF49AF334}" sibTransId="{2101BD5F-A817-9447-AA4F-F4CD3EE95FF0}"/>
-    <dgm:cxn modelId="{2B2CE414-CAEE-4140-BFF5-5D352478002A}" type="presOf" srcId="{68EF91FD-6D20-EC4E-94B8-6B157AAC0116}" destId="{8887EB1A-C2E2-3D48-B5DB-9F1B6E37194E}" srcOrd="0" destOrd="1" presId="urn:microsoft.com/office/officeart/2005/8/layout/chevron1"/>
-    <dgm:cxn modelId="{DD611928-440D-9C4B-8AAE-8F0B17483AB8}" srcId="{7A57F91B-C114-8B4E-86B0-505DD9ED1F5A}" destId="{4A74C196-E0CB-1249-B4E9-31D880902150}" srcOrd="0" destOrd="0" parTransId="{E1750942-93A4-7D4F-B907-5E9CAE950694}" sibTransId="{4110B16D-A48B-6F4E-BA79-244FDB8EBC24}"/>
-    <dgm:cxn modelId="{27437533-6A4C-344C-A83F-EAC62C314FE1}" srcId="{B497304B-0EC9-C641-878A-635376A1DC88}" destId="{1DDCE655-072A-CA46-8C79-B81FBF221E88}" srcOrd="2" destOrd="0" parTransId="{9E541773-9C5F-5B4C-B64B-6558FE1FFD4C}" sibTransId="{EAFFAC9A-B74C-CC40-B663-FF1172784467}"/>
-    <dgm:cxn modelId="{DE342405-6108-1C4B-91B2-230A214F761E}" srcId="{F455E73B-139F-5B4C-B339-D53508984FF3}" destId="{F8AC6589-26B5-DA48-8E39-73845864B478}" srcOrd="0" destOrd="0" parTransId="{F5ED7CAF-3C86-6243-8636-8377907F25CF}" sibTransId="{9C503DC8-7079-DA42-824E-C7F895276D86}"/>
-    <dgm:cxn modelId="{BCB6C379-EA13-EB48-AC42-816FB8E9962E}" type="presOf" srcId="{5CCF9EF2-717F-1E48-AEF3-99045E9A72A6}" destId="{3F0F7C6D-0AC5-AB46-BF90-D57471BE8B55}" srcOrd="0" destOrd="1" presId="urn:microsoft.com/office/officeart/2005/8/layout/chevron1"/>
-    <dgm:cxn modelId="{3054953F-6410-7642-8638-3EF7007D4515}" srcId="{3FA1105B-56D0-E742-B559-3423FE154781}" destId="{7AF78604-2FF9-7A42-99C8-DCF0966BF795}" srcOrd="0" destOrd="0" parTransId="{270D2051-8376-2C42-BC29-A2EBB395EC43}" sibTransId="{D5AD0D8B-FC5D-104F-9E86-D81E5CEBDEA3}"/>
-    <dgm:cxn modelId="{28C87505-83FC-C642-9BA6-B28C71AFAFE7}" srcId="{84EC724F-CD95-8A47-AD7B-E40ECE29B29C}" destId="{5CCF9EF2-717F-1E48-AEF3-99045E9A72A6}" srcOrd="1" destOrd="0" parTransId="{C44D7D03-37CC-8944-AB22-C19942EA80E7}" sibTransId="{7728E7AD-756F-2446-BFE3-0B60C80651D9}"/>
-    <dgm:cxn modelId="{3104ACF8-C7B2-E646-9307-509E63564DCE}" type="presOf" srcId="{B497304B-0EC9-C641-878A-635376A1DC88}" destId="{5ABC5531-B6FA-624C-8342-D73DBAC40F1F}" srcOrd="0" destOrd="0" presId="urn:microsoft.com/office/officeart/2005/8/layout/chevron1"/>
-    <dgm:cxn modelId="{EE8516CC-D3EF-7A41-A9E3-703B74F1EE01}" srcId="{7A57F91B-C114-8B4E-86B0-505DD9ED1F5A}" destId="{B497304B-0EC9-C641-878A-635376A1DC88}" srcOrd="4" destOrd="0" parTransId="{E2CD0753-C669-9243-AB50-EB59323609C4}" sibTransId="{6D25F3CB-D3D1-AE49-9AD6-A8D2551A1BF9}"/>
-    <dgm:cxn modelId="{016F4BC6-4E7D-024B-B2E3-D1C8953222EB}" srcId="{3696EE42-0699-5843-B317-54260231D197}" destId="{68EF91FD-6D20-EC4E-94B8-6B157AAC0116}" srcOrd="1" destOrd="0" parTransId="{666B0721-335C-974B-873B-DF4D42244A8C}" sibTransId="{1D4D69E8-A37A-D049-B8E5-97D15112A038}"/>
-    <dgm:cxn modelId="{E98BE5B1-30A6-1145-8D2F-5BFF1A9A1A00}" type="presOf" srcId="{F8AC6589-26B5-DA48-8E39-73845864B478}" destId="{7DFC62E4-E651-4F40-868C-EB54460A2F8C}" srcOrd="0" destOrd="0" presId="urn:microsoft.com/office/officeart/2005/8/layout/chevron1"/>
-    <dgm:cxn modelId="{119D518A-F2B7-D24E-B8F9-FAC83CAA2AF8}" type="presOf" srcId="{149B45F3-F4BD-BD49-9230-47834B8837E6}" destId="{8887EB1A-C2E2-3D48-B5DB-9F1B6E37194E}" srcOrd="0" destOrd="0" presId="urn:microsoft.com/office/officeart/2005/8/layout/chevron1"/>
-    <dgm:cxn modelId="{24C71B9F-914C-3C4D-91F2-11D5276C9F4D}" type="presOf" srcId="{1DDCE655-072A-CA46-8C79-B81FBF221E88}" destId="{46E28B06-E90D-394A-BC19-3F215570B9DD}" srcOrd="0" destOrd="2" presId="urn:microsoft.com/office/officeart/2005/8/layout/chevron1"/>
-    <dgm:cxn modelId="{0FDAFD2B-A48A-F844-8F2B-D902F986BD6B}" srcId="{7A57F91B-C114-8B4E-86B0-505DD9ED1F5A}" destId="{3FA1105B-56D0-E742-B559-3423FE154781}" srcOrd="5" destOrd="0" parTransId="{4343CE6F-96DF-D34C-B653-DCFAF56D9B91}" sibTransId="{5EF50988-4361-FB43-AD3B-8802A7763BB9}"/>
-    <dgm:cxn modelId="{F78D21E7-9EE7-F94E-9D7C-9DFE4F159838}" srcId="{7A57F91B-C114-8B4E-86B0-505DD9ED1F5A}" destId="{F455E73B-139F-5B4C-B339-D53508984FF3}" srcOrd="1" destOrd="0" parTransId="{F4541FD7-6E3C-3443-B621-FD7409CA5CAA}" sibTransId="{00230CA9-4B0B-B242-8D20-545200546735}"/>
-    <dgm:cxn modelId="{743EBC90-0CD7-2D4A-9427-84D8F0FCD55E}" type="presOf" srcId="{671EDA6E-6736-B447-9A01-111FEA05AE6F}" destId="{7DFC62E4-E651-4F40-868C-EB54460A2F8C}" srcOrd="0" destOrd="2" presId="urn:microsoft.com/office/officeart/2005/8/layout/chevron1"/>
-    <dgm:cxn modelId="{6EB933D0-D521-6545-B383-51A82D1BF565}" type="presOf" srcId="{AD2FACD8-51B8-194A-9DFA-BB7B3CA220D3}" destId="{46E28B06-E90D-394A-BC19-3F215570B9DD}" srcOrd="0" destOrd="1" presId="urn:microsoft.com/office/officeart/2005/8/layout/chevron1"/>
-    <dgm:cxn modelId="{59F04D35-4D43-0F49-A0B9-3BD4A902ACCB}" srcId="{3FA1105B-56D0-E742-B559-3423FE154781}" destId="{E78FED39-41C5-1B4A-9C79-C24870FED316}" srcOrd="1" destOrd="0" parTransId="{71A86EC9-0278-0641-832F-052ABDFBB45D}" sibTransId="{0D28240A-695C-1146-8FD1-30FE4A973B53}"/>
-    <dgm:cxn modelId="{3B1D797C-95C3-F44C-98AA-F1BA5422A5DA}" type="presOf" srcId="{7A57F91B-C114-8B4E-86B0-505DD9ED1F5A}" destId="{D2552DFF-6A88-8C4B-A337-5464BEB40A8D}" srcOrd="0" destOrd="0" presId="urn:microsoft.com/office/officeart/2005/8/layout/chevron1"/>
-    <dgm:cxn modelId="{EB4010C5-6164-DC4A-BDE8-13135CBD5981}" type="presOf" srcId="{F455E73B-139F-5B4C-B339-D53508984FF3}" destId="{4E8F90C4-0AFD-BA4A-8721-D710906AC62E}" srcOrd="0" destOrd="0" presId="urn:microsoft.com/office/officeart/2005/8/layout/chevron1"/>
-    <dgm:cxn modelId="{281335DD-1C0C-6348-9D6D-EAC0AE110E8A}" type="presOf" srcId="{F074EDA9-7961-9341-94F4-2C8A448D4304}" destId="{46E28B06-E90D-394A-BC19-3F215570B9DD}" srcOrd="0" destOrd="0" presId="urn:microsoft.com/office/officeart/2005/8/layout/chevron1"/>
-    <dgm:cxn modelId="{BD88610B-83C2-554A-B16B-0CC8CBCD3641}" srcId="{F455E73B-139F-5B4C-B339-D53508984FF3}" destId="{671EDA6E-6736-B447-9A01-111FEA05AE6F}" srcOrd="2" destOrd="0" parTransId="{56305F1A-C5ED-784E-87B0-54030273357F}" sibTransId="{E3612F99-4F16-C341-9440-0362D7B8DB67}"/>
-    <dgm:cxn modelId="{53C3307B-6F59-0C48-8AA6-80EE40A5DD77}" srcId="{B497304B-0EC9-C641-878A-635376A1DC88}" destId="{F074EDA9-7961-9341-94F4-2C8A448D4304}" srcOrd="0" destOrd="0" parTransId="{E3107CCF-9FBA-A849-9EEC-1FF1E43C56AD}" sibTransId="{11C6DF21-FC58-6147-87DF-2B1CC4183C4A}"/>
-    <dgm:cxn modelId="{B4776EC2-37DF-FC46-B6CC-2030B7D6F4FA}" type="presOf" srcId="{7AF78604-2FF9-7A42-99C8-DCF0966BF795}" destId="{2F587FE5-A5FC-D54E-A534-D04AAED85470}" srcOrd="0" destOrd="0" presId="urn:microsoft.com/office/officeart/2005/8/layout/chevron1"/>
-    <dgm:cxn modelId="{28C34488-F687-7F48-8FCD-8FB5629A17DE}" type="presOf" srcId="{3FA1105B-56D0-E742-B559-3423FE154781}" destId="{EC592A6F-44B1-8244-B7BE-E21154215D48}" srcOrd="0" destOrd="0" presId="urn:microsoft.com/office/officeart/2005/8/layout/chevron1"/>
-    <dgm:cxn modelId="{5CC9A1C7-2DE8-254A-8FCB-EB6EEC98F310}" srcId="{B497304B-0EC9-C641-878A-635376A1DC88}" destId="{AD2FACD8-51B8-194A-9DFA-BB7B3CA220D3}" srcOrd="1" destOrd="0" parTransId="{E7A017B2-CE99-0745-80EA-956548E1D6BF}" sibTransId="{8C2615CD-4925-A444-9F76-4C0AD254542F}"/>
-    <dgm:cxn modelId="{91B4C5E6-E78A-1A45-B73A-BDC9382BFD5E}" type="presOf" srcId="{3696EE42-0699-5843-B317-54260231D197}" destId="{7C16100D-7D03-7B47-80B0-D8730883E916}" srcOrd="0" destOrd="0" presId="urn:microsoft.com/office/officeart/2005/8/layout/chevron1"/>
-    <dgm:cxn modelId="{BC73F862-567A-4542-986C-7097C420A4F6}" type="presOf" srcId="{84EC724F-CD95-8A47-AD7B-E40ECE29B29C}" destId="{6BF6BCA7-8170-9B46-B85B-2EE60E0EBA22}" srcOrd="0" destOrd="0" presId="urn:microsoft.com/office/officeart/2005/8/layout/chevron1"/>
-    <dgm:cxn modelId="{3F5162CD-1DB9-9547-948B-87C63250F9A9}" type="presOf" srcId="{E78FED39-41C5-1B4A-9C79-C24870FED316}" destId="{2F587FE5-A5FC-D54E-A534-D04AAED85470}" srcOrd="0" destOrd="1" presId="urn:microsoft.com/office/officeart/2005/8/layout/chevron1"/>
-    <dgm:cxn modelId="{8B8B1ABD-6B7B-744C-9882-08C32F753AD1}" srcId="{7A57F91B-C114-8B4E-86B0-505DD9ED1F5A}" destId="{3696EE42-0699-5843-B317-54260231D197}" srcOrd="3" destOrd="0" parTransId="{0FFA1B8D-030F-9C47-BE23-2735147E75B5}" sibTransId="{7E24CA96-C115-514B-881D-5FECEDE39366}"/>
     <dgm:cxn modelId="{1447E255-E407-C044-A4B4-B964FB9B2AE9}" type="presParOf" srcId="{D2552DFF-6A88-8C4B-A337-5464BEB40A8D}" destId="{21CC8539-DA6C-B847-828E-205D32DDE42E}" srcOrd="0" destOrd="0" presId="urn:microsoft.com/office/officeart/2005/8/layout/chevron1"/>
     <dgm:cxn modelId="{F373CC96-3037-FA49-BEB4-FBDC15CC512B}" type="presParOf" srcId="{21CC8539-DA6C-B847-828E-205D32DDE42E}" destId="{0DE361F5-0520-2540-9FC8-4E0CB397F72A}" srcOrd="0" destOrd="0" presId="urn:microsoft.com/office/officeart/2005/8/layout/chevron1"/>
     <dgm:cxn modelId="{ACDD1215-5E0E-7648-8DF0-FCADF3424CF0}" type="presParOf" srcId="{21CC8539-DA6C-B847-828E-205D32DDE42E}" destId="{06BC75EC-62A1-9649-ADDE-8C5F6EC71E50}" srcOrd="1" destOrd="0" presId="urn:microsoft.com/office/officeart/2005/8/layout/chevron1"/>
@@ -4418,7 +4433,7 @@
           <a:p>
             <a:fld id="{42C8FD29-FE79-F342-B3A1-DE230763DD95}" type="datetimeFigureOut">
               <a:rPr lang="en-US" smtClean="0"/>
-              <a:t>10/23/12</a:t>
+              <a:t>10/31/12</a:t>
             </a:fld>
             <a:endParaRPr lang="en-US"/>
           </a:p>
@@ -4588,7 +4603,7 @@
           <a:p>
             <a:fld id="{42C8FD29-FE79-F342-B3A1-DE230763DD95}" type="datetimeFigureOut">
               <a:rPr lang="en-US" smtClean="0"/>
-              <a:t>10/23/12</a:t>
+              <a:t>10/31/12</a:t>
             </a:fld>
             <a:endParaRPr lang="en-US"/>
           </a:p>
@@ -4768,7 +4783,7 @@
           <a:p>
             <a:fld id="{42C8FD29-FE79-F342-B3A1-DE230763DD95}" type="datetimeFigureOut">
               <a:rPr lang="en-US" smtClean="0"/>
-              <a:t>10/23/12</a:t>
+              <a:t>10/31/12</a:t>
             </a:fld>
             <a:endParaRPr lang="en-US"/>
           </a:p>
@@ -4938,7 +4953,7 @@
           <a:p>
             <a:fld id="{42C8FD29-FE79-F342-B3A1-DE230763DD95}" type="datetimeFigureOut">
               <a:rPr lang="en-US" smtClean="0"/>
-              <a:t>10/23/12</a:t>
+              <a:t>10/31/12</a:t>
             </a:fld>
             <a:endParaRPr lang="en-US"/>
           </a:p>
@@ -5184,7 +5199,7 @@
           <a:p>
             <a:fld id="{42C8FD29-FE79-F342-B3A1-DE230763DD95}" type="datetimeFigureOut">
               <a:rPr lang="en-US" smtClean="0"/>
-              <a:t>10/23/12</a:t>
+              <a:t>10/31/12</a:t>
             </a:fld>
             <a:endParaRPr lang="en-US"/>
           </a:p>
@@ -5472,7 +5487,7 @@
           <a:p>
             <a:fld id="{42C8FD29-FE79-F342-B3A1-DE230763DD95}" type="datetimeFigureOut">
               <a:rPr lang="en-US" smtClean="0"/>
-              <a:t>10/23/12</a:t>
+              <a:t>10/31/12</a:t>
             </a:fld>
             <a:endParaRPr lang="en-US"/>
           </a:p>
@@ -5894,7 +5909,7 @@
           <a:p>
             <a:fld id="{42C8FD29-FE79-F342-B3A1-DE230763DD95}" type="datetimeFigureOut">
               <a:rPr lang="en-US" smtClean="0"/>
-              <a:t>10/23/12</a:t>
+              <a:t>10/31/12</a:t>
             </a:fld>
             <a:endParaRPr lang="en-US"/>
           </a:p>
@@ -6012,7 +6027,7 @@
           <a:p>
             <a:fld id="{42C8FD29-FE79-F342-B3A1-DE230763DD95}" type="datetimeFigureOut">
               <a:rPr lang="en-US" smtClean="0"/>
-              <a:t>10/23/12</a:t>
+              <a:t>10/31/12</a:t>
             </a:fld>
             <a:endParaRPr lang="en-US"/>
           </a:p>
@@ -6107,7 +6122,7 @@
           <a:p>
             <a:fld id="{42C8FD29-FE79-F342-B3A1-DE230763DD95}" type="datetimeFigureOut">
               <a:rPr lang="en-US" smtClean="0"/>
-              <a:t>10/23/12</a:t>
+              <a:t>10/31/12</a:t>
             </a:fld>
             <a:endParaRPr lang="en-US"/>
           </a:p>
@@ -6384,7 +6399,7 @@
           <a:p>
             <a:fld id="{42C8FD29-FE79-F342-B3A1-DE230763DD95}" type="datetimeFigureOut">
               <a:rPr lang="en-US" smtClean="0"/>
-              <a:t>10/23/12</a:t>
+              <a:t>10/31/12</a:t>
             </a:fld>
             <a:endParaRPr lang="en-US"/>
           </a:p>
@@ -6637,7 +6652,7 @@
           <a:p>
             <a:fld id="{42C8FD29-FE79-F342-B3A1-DE230763DD95}" type="datetimeFigureOut">
               <a:rPr lang="en-US" smtClean="0"/>
-              <a:t>10/23/12</a:t>
+              <a:t>10/31/12</a:t>
             </a:fld>
             <a:endParaRPr lang="en-US"/>
           </a:p>
@@ -6850,7 +6865,7 @@
           <a:p>
             <a:fld id="{42C8FD29-FE79-F342-B3A1-DE230763DD95}" type="datetimeFigureOut">
               <a:rPr lang="en-US" smtClean="0"/>
-              <a:t>10/23/12</a:t>
+              <a:t>10/31/12</a:t>
             </a:fld>
             <a:endParaRPr lang="en-US"/>
           </a:p>
@@ -7457,6 +7472,425 @@
 </p:sld>
 </file>
 
+<file path=ppt/slides/slide3.xml><?xml version="1.0" encoding="utf-8"?>
+<p:sld xmlns:a="http://schemas.openxmlformats.org/drawingml/2006/main" xmlns:r="http://schemas.openxmlformats.org/officeDocument/2006/relationships" xmlns:p="http://schemas.openxmlformats.org/presentationml/2006/main">
+  <p:cSld>
+    <p:spTree>
+      <p:nvGrpSpPr>
+        <p:cNvPr id="1" name=""/>
+        <p:cNvGrpSpPr/>
+        <p:nvPr/>
+      </p:nvGrpSpPr>
+      <p:grpSpPr>
+        <a:xfrm>
+          <a:off x="0" y="0"/>
+          <a:ext cx="0" cy="0"/>
+          <a:chOff x="0" y="0"/>
+          <a:chExt cx="0" cy="0"/>
+        </a:xfrm>
+      </p:grpSpPr>
+      <p:sp>
+        <p:nvSpPr>
+          <p:cNvPr id="4" name="Rectangle 3"/>
+          <p:cNvSpPr/>
+          <p:nvPr/>
+        </p:nvSpPr>
+        <p:spPr>
+          <a:xfrm>
+            <a:off x="1325961" y="1417638"/>
+            <a:ext cx="2857356" cy="1066417"/>
+          </a:xfrm>
+          <a:prstGeom prst="rect">
+            <a:avLst/>
+          </a:prstGeom>
+        </p:spPr>
+        <p:style>
+          <a:lnRef idx="1">
+            <a:schemeClr val="accent1"/>
+          </a:lnRef>
+          <a:fillRef idx="3">
+            <a:schemeClr val="accent1"/>
+          </a:fillRef>
+          <a:effectRef idx="2">
+            <a:schemeClr val="accent1"/>
+          </a:effectRef>
+          <a:fontRef idx="minor">
+            <a:schemeClr val="lt1"/>
+          </a:fontRef>
+        </p:style>
+        <p:txBody>
+          <a:bodyPr rtlCol="0" anchor="ctr"/>
+          <a:lstStyle/>
+          <a:p>
+            <a:pPr algn="ctr"/>
+            <a:r>
+              <a:rPr lang="en-US" sz="1600" dirty="0" smtClean="0"/>
+              <a:t>Browser:</a:t>
+            </a:r>
+          </a:p>
+          <a:p>
+            <a:pPr algn="ctr"/>
+            <a:r>
+              <a:rPr lang="en-US" sz="1600" dirty="0" smtClean="0"/>
+              <a:t>HTML, CSS, jQuery</a:t>
+            </a:r>
+            <a:endParaRPr lang="en-US" sz="1600" dirty="0"/>
+          </a:p>
+        </p:txBody>
+      </p:sp>
+      <p:sp>
+        <p:nvSpPr>
+          <p:cNvPr id="5" name="Rectangle 4"/>
+          <p:cNvSpPr/>
+          <p:nvPr/>
+        </p:nvSpPr>
+        <p:spPr>
+          <a:xfrm>
+            <a:off x="2157022" y="2720502"/>
+            <a:ext cx="2521195" cy="709730"/>
+          </a:xfrm>
+          <a:prstGeom prst="rect">
+            <a:avLst/>
+          </a:prstGeom>
+        </p:spPr>
+        <p:style>
+          <a:lnRef idx="1">
+            <a:schemeClr val="accent1"/>
+          </a:lnRef>
+          <a:fillRef idx="3">
+            <a:schemeClr val="accent1"/>
+          </a:fillRef>
+          <a:effectRef idx="2">
+            <a:schemeClr val="accent1"/>
+          </a:effectRef>
+          <a:fontRef idx="minor">
+            <a:schemeClr val="lt1"/>
+          </a:fontRef>
+        </p:style>
+        <p:txBody>
+          <a:bodyPr rtlCol="0" anchor="ctr"/>
+          <a:lstStyle/>
+          <a:p>
+            <a:pPr algn="ctr"/>
+            <a:r>
+              <a:rPr lang="en-US" sz="1600" dirty="0" smtClean="0"/>
+              <a:t>Views: Freemarker</a:t>
+            </a:r>
+            <a:endParaRPr lang="en-US" sz="1600" dirty="0"/>
+          </a:p>
+        </p:txBody>
+      </p:sp>
+      <p:sp>
+        <p:nvSpPr>
+          <p:cNvPr id="6" name="L-Shape 5"/>
+          <p:cNvSpPr/>
+          <p:nvPr/>
+        </p:nvSpPr>
+        <p:spPr>
+          <a:xfrm>
+            <a:off x="1325961" y="2720502"/>
+            <a:ext cx="3352255" cy="1621925"/>
+          </a:xfrm>
+          <a:prstGeom prst="corner">
+            <a:avLst>
+              <a:gd name="adj1" fmla="val 50000"/>
+              <a:gd name="adj2" fmla="val 44243"/>
+            </a:avLst>
+          </a:prstGeom>
+        </p:spPr>
+        <p:style>
+          <a:lnRef idx="1">
+            <a:schemeClr val="accent1"/>
+          </a:lnRef>
+          <a:fillRef idx="3">
+            <a:schemeClr val="accent1"/>
+          </a:fillRef>
+          <a:effectRef idx="2">
+            <a:schemeClr val="accent1"/>
+          </a:effectRef>
+          <a:fontRef idx="minor">
+            <a:schemeClr val="lt1"/>
+          </a:fontRef>
+        </p:style>
+        <p:txBody>
+          <a:bodyPr rtlCol="0" anchor="ctr"/>
+          <a:lstStyle/>
+          <a:p>
+            <a:pPr algn="ctr"/>
+            <a:r>
+              <a:rPr lang="en-US" sz="1600" dirty="0" smtClean="0"/>
+              <a:t>Spring MVC</a:t>
+            </a:r>
+            <a:endParaRPr lang="en-US" sz="1600" dirty="0"/>
+          </a:p>
+        </p:txBody>
+      </p:sp>
+      <p:sp>
+        <p:nvSpPr>
+          <p:cNvPr id="7" name="Rectangle 6"/>
+          <p:cNvSpPr/>
+          <p:nvPr/>
+        </p:nvSpPr>
+        <p:spPr>
+          <a:xfrm>
+            <a:off x="1325962" y="4491845"/>
+            <a:ext cx="1923578" cy="709730"/>
+          </a:xfrm>
+          <a:prstGeom prst="rect">
+            <a:avLst/>
+          </a:prstGeom>
+        </p:spPr>
+        <p:style>
+          <a:lnRef idx="1">
+            <a:schemeClr val="accent1"/>
+          </a:lnRef>
+          <a:fillRef idx="3">
+            <a:schemeClr val="accent1"/>
+          </a:fillRef>
+          <a:effectRef idx="2">
+            <a:schemeClr val="accent1"/>
+          </a:effectRef>
+          <a:fontRef idx="minor">
+            <a:schemeClr val="lt1"/>
+          </a:fontRef>
+        </p:style>
+        <p:txBody>
+          <a:bodyPr rtlCol="0" anchor="ctr"/>
+          <a:lstStyle/>
+          <a:p>
+            <a:pPr algn="ctr"/>
+            <a:r>
+              <a:rPr lang="en-US" sz="1600" dirty="0" smtClean="0"/>
+              <a:t>Services: </a:t>
+            </a:r>
+          </a:p>
+          <a:p>
+            <a:pPr algn="ctr"/>
+            <a:r>
+              <a:rPr lang="en-US" sz="1600" dirty="0" smtClean="0"/>
+              <a:t>J2EE / CDI / Spring</a:t>
+            </a:r>
+            <a:endParaRPr lang="en-US" sz="1600" dirty="0"/>
+          </a:p>
+        </p:txBody>
+      </p:sp>
+      <p:sp>
+        <p:nvSpPr>
+          <p:cNvPr id="8" name="Can 7"/>
+          <p:cNvSpPr/>
+          <p:nvPr/>
+        </p:nvSpPr>
+        <p:spPr>
+          <a:xfrm>
+            <a:off x="4220664" y="4482506"/>
+            <a:ext cx="1438017" cy="719069"/>
+          </a:xfrm>
+          <a:prstGeom prst="can">
+            <a:avLst/>
+          </a:prstGeom>
+        </p:spPr>
+        <p:style>
+          <a:lnRef idx="1">
+            <a:schemeClr val="accent1"/>
+          </a:lnRef>
+          <a:fillRef idx="3">
+            <a:schemeClr val="accent1"/>
+          </a:fillRef>
+          <a:effectRef idx="2">
+            <a:schemeClr val="accent1"/>
+          </a:effectRef>
+          <a:fontRef idx="minor">
+            <a:schemeClr val="lt1"/>
+          </a:fontRef>
+        </p:style>
+        <p:txBody>
+          <a:bodyPr rtlCol="0" anchor="ctr"/>
+          <a:lstStyle/>
+          <a:p>
+            <a:pPr algn="ctr"/>
+            <a:r>
+              <a:rPr lang="en-US" sz="1600" dirty="0" smtClean="0"/>
+              <a:t>MySQL</a:t>
+            </a:r>
+            <a:endParaRPr lang="en-US" sz="1600" dirty="0"/>
+          </a:p>
+        </p:txBody>
+      </p:sp>
+      <p:sp>
+        <p:nvSpPr>
+          <p:cNvPr id="9" name="Can 8"/>
+          <p:cNvSpPr/>
+          <p:nvPr/>
+        </p:nvSpPr>
+        <p:spPr>
+          <a:xfrm>
+            <a:off x="3352254" y="4491845"/>
+            <a:ext cx="784373" cy="719069"/>
+          </a:xfrm>
+          <a:prstGeom prst="can">
+            <a:avLst/>
+          </a:prstGeom>
+        </p:spPr>
+        <p:style>
+          <a:lnRef idx="1">
+            <a:schemeClr val="accent1"/>
+          </a:lnRef>
+          <a:fillRef idx="3">
+            <a:schemeClr val="accent1"/>
+          </a:fillRef>
+          <a:effectRef idx="2">
+            <a:schemeClr val="accent1"/>
+          </a:effectRef>
+          <a:fontRef idx="minor">
+            <a:schemeClr val="lt1"/>
+          </a:fontRef>
+        </p:style>
+        <p:txBody>
+          <a:bodyPr rtlCol="0" anchor="ctr"/>
+          <a:lstStyle/>
+          <a:p>
+            <a:pPr algn="ctr"/>
+            <a:r>
+              <a:rPr lang="en-US" sz="1600" dirty="0" smtClean="0"/>
+              <a:t>Solr</a:t>
+            </a:r>
+            <a:endParaRPr lang="en-US" sz="1600" dirty="0"/>
+          </a:p>
+        </p:txBody>
+      </p:sp>
+      <p:cxnSp>
+        <p:nvCxnSpPr>
+          <p:cNvPr id="11" name="Straight Connector 10"/>
+          <p:cNvCxnSpPr/>
+          <p:nvPr/>
+        </p:nvCxnSpPr>
+        <p:spPr>
+          <a:xfrm>
+            <a:off x="1325961" y="2605455"/>
+            <a:ext cx="4332720" cy="0"/>
+          </a:xfrm>
+          <a:prstGeom prst="line">
+            <a:avLst/>
+          </a:prstGeom>
+        </p:spPr>
+        <p:style>
+          <a:lnRef idx="2">
+            <a:schemeClr val="accent1"/>
+          </a:lnRef>
+          <a:fillRef idx="0">
+            <a:schemeClr val="accent1"/>
+          </a:fillRef>
+          <a:effectRef idx="1">
+            <a:schemeClr val="accent1"/>
+          </a:effectRef>
+          <a:fontRef idx="minor">
+            <a:schemeClr val="tx1"/>
+          </a:fontRef>
+        </p:style>
+      </p:cxnSp>
+      <p:sp>
+        <p:nvSpPr>
+          <p:cNvPr id="12" name="Rectangle 11"/>
+          <p:cNvSpPr/>
+          <p:nvPr/>
+        </p:nvSpPr>
+        <p:spPr>
+          <a:xfrm>
+            <a:off x="4295368" y="1417638"/>
+            <a:ext cx="1363313" cy="1066417"/>
+          </a:xfrm>
+          <a:prstGeom prst="rect">
+            <a:avLst/>
+          </a:prstGeom>
+        </p:spPr>
+        <p:style>
+          <a:lnRef idx="1">
+            <a:schemeClr val="accent1"/>
+          </a:lnRef>
+          <a:fillRef idx="3">
+            <a:schemeClr val="accent1"/>
+          </a:fillRef>
+          <a:effectRef idx="2">
+            <a:schemeClr val="accent1"/>
+          </a:effectRef>
+          <a:fontRef idx="minor">
+            <a:schemeClr val="lt1"/>
+          </a:fontRef>
+        </p:style>
+        <p:txBody>
+          <a:bodyPr rtlCol="0" anchor="ctr"/>
+          <a:lstStyle/>
+          <a:p>
+            <a:pPr algn="ctr"/>
+            <a:r>
+              <a:rPr lang="en-US" sz="1600" dirty="0" smtClean="0"/>
+              <a:t>iOS, Android, jQuery Mobile</a:t>
+            </a:r>
+          </a:p>
+        </p:txBody>
+      </p:sp>
+      <p:sp>
+        <p:nvSpPr>
+          <p:cNvPr id="13" name="Rectangle 12"/>
+          <p:cNvSpPr/>
+          <p:nvPr/>
+        </p:nvSpPr>
+        <p:spPr>
+          <a:xfrm>
+            <a:off x="4780932" y="2720502"/>
+            <a:ext cx="877749" cy="1621925"/>
+          </a:xfrm>
+          <a:prstGeom prst="rect">
+            <a:avLst/>
+          </a:prstGeom>
+        </p:spPr>
+        <p:style>
+          <a:lnRef idx="1">
+            <a:schemeClr val="accent1"/>
+          </a:lnRef>
+          <a:fillRef idx="3">
+            <a:schemeClr val="accent1"/>
+          </a:fillRef>
+          <a:effectRef idx="2">
+            <a:schemeClr val="accent1"/>
+          </a:effectRef>
+          <a:fontRef idx="minor">
+            <a:schemeClr val="lt1"/>
+          </a:fontRef>
+        </p:style>
+        <p:txBody>
+          <a:bodyPr vert="vert270" rtlCol="0" anchor="ctr"/>
+          <a:lstStyle/>
+          <a:p>
+            <a:pPr algn="ctr"/>
+            <a:r>
+              <a:rPr lang="en-US" dirty="0" smtClean="0"/>
+              <a:t>Domain Model</a:t>
+            </a:r>
+            <a:endParaRPr lang="en-US" dirty="0"/>
+          </a:p>
+        </p:txBody>
+      </p:sp>
+    </p:spTree>
+    <p:extLst>
+      <p:ext uri="{BB962C8B-B14F-4D97-AF65-F5344CB8AC3E}">
+        <p14:creationId xmlns:p14="http://schemas.microsoft.com/office/powerpoint/2010/main" val="319882495"/>
+      </p:ext>
+    </p:extLst>
+  </p:cSld>
+  <p:clrMapOvr>
+    <a:masterClrMapping/>
+  </p:clrMapOvr>
+  <p:timing>
+    <p:tnLst>
+      <p:par>
+        <p:cTn xmlns:p14="http://schemas.microsoft.com/office/powerpoint/2010/main" id="1" dur="indefinite" restart="never" nodeType="tmRoot"/>
+      </p:par>
+    </p:tnLst>
+  </p:timing>
+</p:sld>
+</file>
+
 <file path=ppt/theme/theme1.xml><?xml version="1.0" encoding="utf-8"?>
 <a:theme xmlns:a="http://schemas.openxmlformats.org/drawingml/2006/main" name="Office Theme">
   <a:themeElements>

</xml_diff>

<commit_message>
Implemented HP map and how,what,why navigation state styles
</commit_message>
<xml_diff>
--- a/SL_website_components.pptx
+++ b/SL_website_components.pptx
@@ -7972,6 +7972,9 @@
               <a:alpha val="26000"/>
             </a:schemeClr>
           </a:solidFill>
+          <a:ln>
+            <a:noFill/>
+          </a:ln>
         </p:spPr>
         <p:style>
           <a:lnRef idx="1">
@@ -8216,6 +8219,9 @@
               <a:alpha val="26000"/>
             </a:schemeClr>
           </a:solidFill>
+          <a:ln>
+            <a:noFill/>
+          </a:ln>
         </p:spPr>
         <p:style>
           <a:lnRef idx="1">

</xml_diff>

<commit_message>
Disable auto-rotate on /clients, introduced hash param
</commit_message>
<xml_diff>
--- a/SL_website_components.pptx
+++ b/SL_website_components.pptx
@@ -9,6 +9,8 @@
     <p:sldId id="258" r:id="rId3"/>
     <p:sldId id="259" r:id="rId4"/>
     <p:sldId id="260" r:id="rId5"/>
+    <p:sldId id="261" r:id="rId6"/>
+    <p:sldId id="262" r:id="rId7"/>
   </p:sldIdLst>
   <p:sldSz cx="9144000" cy="6858000" type="screen4x3"/>
   <p:notesSz cx="6858000" cy="9144000"/>
@@ -4434,7 +4436,7 @@
           <a:p>
             <a:fld id="{42C8FD29-FE79-F342-B3A1-DE230763DD95}" type="datetimeFigureOut">
               <a:rPr lang="en-US" smtClean="0"/>
-              <a:t>11/13/12</a:t>
+              <a:t>11/15/12</a:t>
             </a:fld>
             <a:endParaRPr lang="en-US"/>
           </a:p>
@@ -4604,7 +4606,7 @@
           <a:p>
             <a:fld id="{42C8FD29-FE79-F342-B3A1-DE230763DD95}" type="datetimeFigureOut">
               <a:rPr lang="en-US" smtClean="0"/>
-              <a:t>11/13/12</a:t>
+              <a:t>11/15/12</a:t>
             </a:fld>
             <a:endParaRPr lang="en-US"/>
           </a:p>
@@ -4784,7 +4786,7 @@
           <a:p>
             <a:fld id="{42C8FD29-FE79-F342-B3A1-DE230763DD95}" type="datetimeFigureOut">
               <a:rPr lang="en-US" smtClean="0"/>
-              <a:t>11/13/12</a:t>
+              <a:t>11/15/12</a:t>
             </a:fld>
             <a:endParaRPr lang="en-US"/>
           </a:p>
@@ -4954,7 +4956,7 @@
           <a:p>
             <a:fld id="{42C8FD29-FE79-F342-B3A1-DE230763DD95}" type="datetimeFigureOut">
               <a:rPr lang="en-US" smtClean="0"/>
-              <a:t>11/13/12</a:t>
+              <a:t>11/15/12</a:t>
             </a:fld>
             <a:endParaRPr lang="en-US"/>
           </a:p>
@@ -5200,7 +5202,7 @@
           <a:p>
             <a:fld id="{42C8FD29-FE79-F342-B3A1-DE230763DD95}" type="datetimeFigureOut">
               <a:rPr lang="en-US" smtClean="0"/>
-              <a:t>11/13/12</a:t>
+              <a:t>11/15/12</a:t>
             </a:fld>
             <a:endParaRPr lang="en-US"/>
           </a:p>
@@ -5488,7 +5490,7 @@
           <a:p>
             <a:fld id="{42C8FD29-FE79-F342-B3A1-DE230763DD95}" type="datetimeFigureOut">
               <a:rPr lang="en-US" smtClean="0"/>
-              <a:t>11/13/12</a:t>
+              <a:t>11/15/12</a:t>
             </a:fld>
             <a:endParaRPr lang="en-US"/>
           </a:p>
@@ -5910,7 +5912,7 @@
           <a:p>
             <a:fld id="{42C8FD29-FE79-F342-B3A1-DE230763DD95}" type="datetimeFigureOut">
               <a:rPr lang="en-US" smtClean="0"/>
-              <a:t>11/13/12</a:t>
+              <a:t>11/15/12</a:t>
             </a:fld>
             <a:endParaRPr lang="en-US"/>
           </a:p>
@@ -6028,7 +6030,7 @@
           <a:p>
             <a:fld id="{42C8FD29-FE79-F342-B3A1-DE230763DD95}" type="datetimeFigureOut">
               <a:rPr lang="en-US" smtClean="0"/>
-              <a:t>11/13/12</a:t>
+              <a:t>11/15/12</a:t>
             </a:fld>
             <a:endParaRPr lang="en-US"/>
           </a:p>
@@ -6123,7 +6125,7 @@
           <a:p>
             <a:fld id="{42C8FD29-FE79-F342-B3A1-DE230763DD95}" type="datetimeFigureOut">
               <a:rPr lang="en-US" smtClean="0"/>
-              <a:t>11/13/12</a:t>
+              <a:t>11/15/12</a:t>
             </a:fld>
             <a:endParaRPr lang="en-US"/>
           </a:p>
@@ -6400,7 +6402,7 @@
           <a:p>
             <a:fld id="{42C8FD29-FE79-F342-B3A1-DE230763DD95}" type="datetimeFigureOut">
               <a:rPr lang="en-US" smtClean="0"/>
-              <a:t>11/13/12</a:t>
+              <a:t>11/15/12</a:t>
             </a:fld>
             <a:endParaRPr lang="en-US"/>
           </a:p>
@@ -6653,7 +6655,7 @@
           <a:p>
             <a:fld id="{42C8FD29-FE79-F342-B3A1-DE230763DD95}" type="datetimeFigureOut">
               <a:rPr lang="en-US" smtClean="0"/>
-              <a:t>11/13/12</a:t>
+              <a:t>11/15/12</a:t>
             </a:fld>
             <a:endParaRPr lang="en-US"/>
           </a:p>
@@ -6866,7 +6868,7 @@
           <a:p>
             <a:fld id="{42C8FD29-FE79-F342-B3A1-DE230763DD95}" type="datetimeFigureOut">
               <a:rPr lang="en-US" smtClean="0"/>
-              <a:t>11/13/12</a:t>
+              <a:t>11/15/12</a:t>
             </a:fld>
             <a:endParaRPr lang="en-US"/>
           </a:p>
@@ -9037,6 +9039,522 @@
 </p:sld>
 </file>
 
+<file path=ppt/slides/slide5.xml><?xml version="1.0" encoding="utf-8"?>
+<p:sld xmlns:a="http://schemas.openxmlformats.org/drawingml/2006/main" xmlns:r="http://schemas.openxmlformats.org/officeDocument/2006/relationships" xmlns:p="http://schemas.openxmlformats.org/presentationml/2006/main">
+  <p:cSld>
+    <p:spTree>
+      <p:nvGrpSpPr>
+        <p:cNvPr id="1" name=""/>
+        <p:cNvGrpSpPr/>
+        <p:nvPr/>
+      </p:nvGrpSpPr>
+      <p:grpSpPr>
+        <a:xfrm>
+          <a:off x="0" y="0"/>
+          <a:ext cx="0" cy="0"/>
+          <a:chOff x="0" y="0"/>
+          <a:chExt cx="0" cy="0"/>
+        </a:xfrm>
+      </p:grpSpPr>
+      <p:sp>
+        <p:nvSpPr>
+          <p:cNvPr id="10" name="Rectangle 9"/>
+          <p:cNvSpPr/>
+          <p:nvPr/>
+        </p:nvSpPr>
+        <p:spPr>
+          <a:xfrm>
+            <a:off x="181434" y="941239"/>
+            <a:ext cx="8663483" cy="3923717"/>
+          </a:xfrm>
+          <a:prstGeom prst="rect">
+            <a:avLst/>
+          </a:prstGeom>
+          <a:solidFill>
+            <a:srgbClr val="CC9933">
+              <a:alpha val="26000"/>
+            </a:srgbClr>
+          </a:solidFill>
+        </p:spPr>
+        <p:style>
+          <a:lnRef idx="1">
+            <a:schemeClr val="accent1"/>
+          </a:lnRef>
+          <a:fillRef idx="3">
+            <a:schemeClr val="accent1"/>
+          </a:fillRef>
+          <a:effectRef idx="2">
+            <a:schemeClr val="accent1"/>
+          </a:effectRef>
+          <a:fontRef idx="minor">
+            <a:schemeClr val="lt1"/>
+          </a:fontRef>
+        </p:style>
+        <p:txBody>
+          <a:bodyPr rtlCol="0" anchor="ctr"/>
+          <a:lstStyle/>
+          <a:p>
+            <a:pPr algn="ctr"/>
+            <a:endParaRPr lang="en-US"/>
+          </a:p>
+        </p:txBody>
+      </p:sp>
+      <p:sp>
+        <p:nvSpPr>
+          <p:cNvPr id="4" name="Rectangle 3"/>
+          <p:cNvSpPr/>
+          <p:nvPr/>
+        </p:nvSpPr>
+        <p:spPr>
+          <a:xfrm>
+            <a:off x="464929" y="2528870"/>
+            <a:ext cx="782435" cy="691753"/>
+          </a:xfrm>
+          <a:prstGeom prst="rect">
+            <a:avLst/>
+          </a:prstGeom>
+          <a:solidFill>
+            <a:schemeClr val="bg2">
+              <a:lumMod val="50000"/>
+              <a:alpha val="26000"/>
+            </a:schemeClr>
+          </a:solidFill>
+          <a:ln>
+            <a:noFill/>
+          </a:ln>
+        </p:spPr>
+        <p:style>
+          <a:lnRef idx="1">
+            <a:schemeClr val="accent1"/>
+          </a:lnRef>
+          <a:fillRef idx="3">
+            <a:schemeClr val="accent1"/>
+          </a:fillRef>
+          <a:effectRef idx="2">
+            <a:schemeClr val="accent1"/>
+          </a:effectRef>
+          <a:fontRef idx="minor">
+            <a:schemeClr val="lt1"/>
+          </a:fontRef>
+        </p:style>
+        <p:txBody>
+          <a:bodyPr rtlCol="0" anchor="ctr"/>
+          <a:lstStyle/>
+          <a:p>
+            <a:pPr algn="ctr"/>
+            <a:r>
+              <a:rPr lang="en-US" dirty="0" smtClean="0">
+                <a:solidFill>
+                  <a:schemeClr val="tx1"/>
+                </a:solidFill>
+              </a:rPr>
+              <a:t>Today</a:t>
+            </a:r>
+            <a:endParaRPr lang="en-US" dirty="0">
+              <a:solidFill>
+                <a:schemeClr val="tx1"/>
+              </a:solidFill>
+            </a:endParaRPr>
+          </a:p>
+        </p:txBody>
+      </p:sp>
+      <p:sp>
+        <p:nvSpPr>
+          <p:cNvPr id="7" name="TextBox 6"/>
+          <p:cNvSpPr txBox="1"/>
+          <p:nvPr/>
+        </p:nvSpPr>
+        <p:spPr>
+          <a:xfrm>
+            <a:off x="2291575" y="2706785"/>
+            <a:ext cx="1256098" cy="305233"/>
+          </a:xfrm>
+          <a:prstGeom prst="rect">
+            <a:avLst/>
+          </a:prstGeom>
+          <a:noFill/>
+        </p:spPr>
+        <p:txBody>
+          <a:bodyPr wrap="none" rtlCol="0">
+            <a:spAutoFit/>
+          </a:bodyPr>
+          <a:lstStyle/>
+          <a:p>
+            <a:r>
+              <a:rPr lang="en-US" dirty="0" smtClean="0"/>
+              <a:t>CTO Search</a:t>
+            </a:r>
+            <a:endParaRPr lang="en-US" dirty="0"/>
+          </a:p>
+        </p:txBody>
+      </p:sp>
+      <p:pic>
+        <p:nvPicPr>
+          <p:cNvPr id="12" name="Picture 11" descr="map-31589_640.png"/>
+          <p:cNvPicPr>
+            <a:picLocks noChangeAspect="1"/>
+          </p:cNvPicPr>
+          <p:nvPr/>
+        </p:nvPicPr>
+        <p:blipFill>
+          <a:blip r:embed="rId2">
+            <a:extLst>
+              <a:ext uri="{28A0092B-C50C-407E-A947-70E740481C1C}">
+                <a14:useLocalDpi xmlns:a14="http://schemas.microsoft.com/office/drawing/2010/main" val="0"/>
+              </a:ext>
+            </a:extLst>
+          </a:blip>
+          <a:stretch>
+            <a:fillRect/>
+          </a:stretch>
+        </p:blipFill>
+        <p:spPr>
+          <a:xfrm>
+            <a:off x="2296111" y="1744463"/>
+            <a:ext cx="1456373" cy="882925"/>
+          </a:xfrm>
+          <a:prstGeom prst="rect">
+            <a:avLst/>
+          </a:prstGeom>
+        </p:spPr>
+      </p:pic>
+      <p:pic>
+        <p:nvPicPr>
+          <p:cNvPr id="13" name="Picture 12" descr="map-31589_640.png"/>
+          <p:cNvPicPr>
+            <a:picLocks noChangeAspect="1"/>
+          </p:cNvPicPr>
+          <p:nvPr/>
+        </p:nvPicPr>
+        <p:blipFill>
+          <a:blip r:embed="rId2">
+            <a:extLst>
+              <a:ext uri="{28A0092B-C50C-407E-A947-70E740481C1C}">
+                <a14:useLocalDpi xmlns:a14="http://schemas.microsoft.com/office/drawing/2010/main" val="0"/>
+              </a:ext>
+            </a:extLst>
+          </a:blip>
+          <a:stretch>
+            <a:fillRect/>
+          </a:stretch>
+        </p:blipFill>
+        <p:spPr>
+          <a:xfrm>
+            <a:off x="3541984" y="2955971"/>
+            <a:ext cx="1762211" cy="1068340"/>
+          </a:xfrm>
+          <a:prstGeom prst="rect">
+            <a:avLst/>
+          </a:prstGeom>
+        </p:spPr>
+      </p:pic>
+      <p:sp>
+        <p:nvSpPr>
+          <p:cNvPr id="14" name="TextBox 13"/>
+          <p:cNvSpPr txBox="1"/>
+          <p:nvPr/>
+        </p:nvSpPr>
+        <p:spPr>
+          <a:xfrm>
+            <a:off x="3511307" y="4024311"/>
+            <a:ext cx="2031325" cy="646331"/>
+          </a:xfrm>
+          <a:prstGeom prst="rect">
+            <a:avLst/>
+          </a:prstGeom>
+          <a:noFill/>
+        </p:spPr>
+        <p:txBody>
+          <a:bodyPr wrap="none" rtlCol="0">
+            <a:spAutoFit/>
+          </a:bodyPr>
+          <a:lstStyle/>
+          <a:p>
+            <a:pPr algn="ctr"/>
+            <a:r>
+              <a:rPr lang="en-US" dirty="0" smtClean="0"/>
+              <a:t>Flexible Technology</a:t>
+            </a:r>
+          </a:p>
+          <a:p>
+            <a:pPr algn="ctr"/>
+            <a:r>
+              <a:rPr lang="en-US" dirty="0" smtClean="0"/>
+              <a:t>Platform</a:t>
+            </a:r>
+            <a:endParaRPr lang="en-US" dirty="0"/>
+          </a:p>
+        </p:txBody>
+      </p:sp>
+      <p:pic>
+        <p:nvPicPr>
+          <p:cNvPr id="15" name="Picture 14" descr="map-31589_640.png"/>
+          <p:cNvPicPr>
+            <a:picLocks noChangeAspect="1"/>
+          </p:cNvPicPr>
+          <p:nvPr/>
+        </p:nvPicPr>
+        <p:blipFill>
+          <a:blip r:embed="rId2">
+            <a:extLst>
+              <a:ext uri="{28A0092B-C50C-407E-A947-70E740481C1C}">
+                <a14:useLocalDpi xmlns:a14="http://schemas.microsoft.com/office/drawing/2010/main" val="0"/>
+              </a:ext>
+            </a:extLst>
+          </a:blip>
+          <a:stretch>
+            <a:fillRect/>
+          </a:stretch>
+        </p:blipFill>
+        <p:spPr>
+          <a:xfrm>
+            <a:off x="5123182" y="1198155"/>
+            <a:ext cx="1762211" cy="1068340"/>
+          </a:xfrm>
+          <a:prstGeom prst="rect">
+            <a:avLst/>
+          </a:prstGeom>
+        </p:spPr>
+      </p:pic>
+      <p:sp>
+        <p:nvSpPr>
+          <p:cNvPr id="16" name="TextBox 15"/>
+          <p:cNvSpPr txBox="1"/>
+          <p:nvPr/>
+        </p:nvSpPr>
+        <p:spPr>
+          <a:xfrm>
+            <a:off x="5194565" y="2266495"/>
+            <a:ext cx="1810073" cy="369332"/>
+          </a:xfrm>
+          <a:prstGeom prst="rect">
+            <a:avLst/>
+          </a:prstGeom>
+          <a:noFill/>
+        </p:spPr>
+        <p:txBody>
+          <a:bodyPr wrap="none" rtlCol="0">
+            <a:spAutoFit/>
+          </a:bodyPr>
+          <a:lstStyle/>
+          <a:p>
+            <a:r>
+              <a:rPr lang="en-US" dirty="0" smtClean="0"/>
+              <a:t>Scaling The Team</a:t>
+            </a:r>
+            <a:endParaRPr lang="en-US" dirty="0"/>
+          </a:p>
+        </p:txBody>
+      </p:sp>
+      <p:sp>
+        <p:nvSpPr>
+          <p:cNvPr id="17" name="Rectangle 16"/>
+          <p:cNvSpPr/>
+          <p:nvPr/>
+        </p:nvSpPr>
+        <p:spPr>
+          <a:xfrm>
+            <a:off x="7489144" y="2528870"/>
+            <a:ext cx="1060942" cy="691753"/>
+          </a:xfrm>
+          <a:prstGeom prst="rect">
+            <a:avLst/>
+          </a:prstGeom>
+          <a:solidFill>
+            <a:schemeClr val="bg2">
+              <a:lumMod val="50000"/>
+              <a:alpha val="26000"/>
+            </a:schemeClr>
+          </a:solidFill>
+          <a:ln>
+            <a:noFill/>
+          </a:ln>
+        </p:spPr>
+        <p:style>
+          <a:lnRef idx="1">
+            <a:schemeClr val="accent1"/>
+          </a:lnRef>
+          <a:fillRef idx="3">
+            <a:schemeClr val="accent1"/>
+          </a:fillRef>
+          <a:effectRef idx="2">
+            <a:schemeClr val="accent1"/>
+          </a:effectRef>
+          <a:fontRef idx="minor">
+            <a:schemeClr val="lt1"/>
+          </a:fontRef>
+        </p:style>
+        <p:txBody>
+          <a:bodyPr rtlCol="0" anchor="ctr"/>
+          <a:lstStyle/>
+          <a:p>
+            <a:pPr algn="ctr"/>
+            <a:r>
+              <a:rPr lang="en-US" dirty="0" smtClean="0">
+                <a:solidFill>
+                  <a:schemeClr val="tx1"/>
+                </a:solidFill>
+              </a:rPr>
+              <a:t>Product</a:t>
+            </a:r>
+            <a:br>
+              <a:rPr lang="en-US" dirty="0" smtClean="0">
+                <a:solidFill>
+                  <a:schemeClr val="tx1"/>
+                </a:solidFill>
+              </a:rPr>
+            </a:br>
+            <a:r>
+              <a:rPr lang="en-US" dirty="0" smtClean="0">
+                <a:solidFill>
+                  <a:schemeClr val="tx1"/>
+                </a:solidFill>
+              </a:rPr>
+              <a:t>Success</a:t>
+            </a:r>
+            <a:endParaRPr lang="en-US" dirty="0">
+              <a:solidFill>
+                <a:schemeClr val="tx1"/>
+              </a:solidFill>
+            </a:endParaRPr>
+          </a:p>
+        </p:txBody>
+      </p:sp>
+    </p:spTree>
+    <p:extLst>
+      <p:ext uri="{BB962C8B-B14F-4D97-AF65-F5344CB8AC3E}">
+        <p14:creationId xmlns:p14="http://schemas.microsoft.com/office/powerpoint/2010/main" val="1619281476"/>
+      </p:ext>
+    </p:extLst>
+  </p:cSld>
+  <p:clrMapOvr>
+    <a:masterClrMapping/>
+  </p:clrMapOvr>
+</p:sld>
+</file>
+
+<file path=ppt/slides/slide6.xml><?xml version="1.0" encoding="utf-8"?>
+<p:sld xmlns:a="http://schemas.openxmlformats.org/drawingml/2006/main" xmlns:r="http://schemas.openxmlformats.org/officeDocument/2006/relationships" xmlns:p="http://schemas.openxmlformats.org/presentationml/2006/main">
+  <p:cSld>
+    <p:spTree>
+      <p:nvGrpSpPr>
+        <p:cNvPr id="1" name=""/>
+        <p:cNvGrpSpPr/>
+        <p:nvPr/>
+      </p:nvGrpSpPr>
+      <p:grpSpPr>
+        <a:xfrm>
+          <a:off x="0" y="0"/>
+          <a:ext cx="0" cy="0"/>
+          <a:chOff x="0" y="0"/>
+          <a:chExt cx="0" cy="0"/>
+        </a:xfrm>
+      </p:grpSpPr>
+      <p:sp>
+        <p:nvSpPr>
+          <p:cNvPr id="2" name="Title 1"/>
+          <p:cNvSpPr>
+            <a:spLocks noGrp="1"/>
+          </p:cNvSpPr>
+          <p:nvPr>
+            <p:ph type="title"/>
+          </p:nvPr>
+        </p:nvSpPr>
+        <p:spPr/>
+        <p:txBody>
+          <a:bodyPr>
+            <a:noAutofit/>
+          </a:bodyPr>
+          <a:lstStyle/>
+          <a:p>
+            <a:r>
+              <a:rPr lang="en-US" sz="2400" dirty="0" err="1"/>
+              <a:t>Scandi</a:t>
+            </a:r>
+            <a:r>
+              <a:rPr lang="en-US" sz="2400" dirty="0"/>
+              <a:t> Labs helps startups overcome technology obstacles.</a:t>
+            </a:r>
+          </a:p>
+        </p:txBody>
+      </p:sp>
+      <p:pic>
+        <p:nvPicPr>
+          <p:cNvPr id="5" name="Picture 4" descr="rocks.png"/>
+          <p:cNvPicPr>
+            <a:picLocks noChangeAspect="1"/>
+          </p:cNvPicPr>
+          <p:nvPr/>
+        </p:nvPicPr>
+        <p:blipFill>
+          <a:blip r:embed="rId2">
+            <a:extLst>
+              <a:ext uri="{28A0092B-C50C-407E-A947-70E740481C1C}">
+                <a14:useLocalDpi xmlns:a14="http://schemas.microsoft.com/office/drawing/2010/main" val="0"/>
+              </a:ext>
+            </a:extLst>
+          </a:blip>
+          <a:stretch>
+            <a:fillRect/>
+          </a:stretch>
+        </p:blipFill>
+        <p:spPr>
+          <a:xfrm>
+            <a:off x="0" y="1343029"/>
+            <a:ext cx="9144000" cy="3665157"/>
+          </a:xfrm>
+          <a:prstGeom prst="rect">
+            <a:avLst/>
+          </a:prstGeom>
+        </p:spPr>
+      </p:pic>
+      <p:sp>
+        <p:nvSpPr>
+          <p:cNvPr id="6" name="TextBox 5"/>
+          <p:cNvSpPr txBox="1"/>
+          <p:nvPr/>
+        </p:nvSpPr>
+        <p:spPr>
+          <a:xfrm>
+            <a:off x="454224" y="2880417"/>
+            <a:ext cx="8232576" cy="369332"/>
+          </a:xfrm>
+          <a:prstGeom prst="rect">
+            <a:avLst/>
+          </a:prstGeom>
+          <a:solidFill>
+            <a:schemeClr val="bg1">
+              <a:alpha val="79000"/>
+            </a:schemeClr>
+          </a:solidFill>
+        </p:spPr>
+        <p:txBody>
+          <a:bodyPr wrap="square" rtlCol="0">
+            <a:spAutoFit/>
+          </a:bodyPr>
+          <a:lstStyle/>
+          <a:p>
+            <a:pPr algn="ctr"/>
+            <a:r>
+              <a:rPr lang="en-US" dirty="0" smtClean="0"/>
+              <a:t>CTO Search  |  Technology Platform  |  Scaling The Team  |  MVP Development</a:t>
+            </a:r>
+          </a:p>
+        </p:txBody>
+      </p:sp>
+    </p:spTree>
+    <p:extLst>
+      <p:ext uri="{BB962C8B-B14F-4D97-AF65-F5344CB8AC3E}">
+        <p14:creationId xmlns:p14="http://schemas.microsoft.com/office/powerpoint/2010/main" val="4107468049"/>
+      </p:ext>
+    </p:extLst>
+  </p:cSld>
+  <p:clrMapOvr>
+    <a:masterClrMapping/>
+  </p:clrMapOvr>
+</p:sld>
+</file>
+
 <file path=ppt/theme/theme1.xml><?xml version="1.0" encoding="utf-8"?>
 <a:theme xmlns:a="http://schemas.openxmlformats.org/drawingml/2006/main" name="Office Theme">
   <a:themeElements>

</xml_diff>